<commit_message>
Adding subsetting and encoding functions
</commit_message>
<xml_diff>
--- a/docs/Presentation.pptx
+++ b/docs/Presentation.pptx
@@ -4244,13 +4244,13 @@
           <a:p>
             <a:r>
               <a:rPr lang="en-CH" dirty="0"/>
-              <a:t>There are 619’046 normal samples for 2’244 abnormal ones. </a:t>
+              <a:t>There are 619’046 normal samples for 4’045 abnormal ones. </a:t>
             </a:r>
           </a:p>
           <a:p>
             <a:r>
               <a:rPr lang="en-CH" dirty="0"/>
-              <a:t>The abnormal ones represents 0.36% of the total http connections. </a:t>
+              <a:t>The abnormal ones represents 0.65% of the total http connections. </a:t>
             </a:r>
           </a:p>
           <a:p>

</xml_diff>

<commit_message>
Presentation and minor improvements
</commit_message>
<xml_diff>
--- a/docs/Presentation.pptx
+++ b/docs/Presentation.pptx
@@ -7,11 +7,11 @@
   <p:sldIdLst>
     <p:sldId id="256" r:id="rId2"/>
     <p:sldId id="257" r:id="rId3"/>
-    <p:sldId id="259" r:id="rId4"/>
-    <p:sldId id="258" r:id="rId5"/>
-    <p:sldId id="261" r:id="rId6"/>
-    <p:sldId id="262" r:id="rId7"/>
-    <p:sldId id="263" r:id="rId8"/>
+    <p:sldId id="258" r:id="rId4"/>
+    <p:sldId id="261" r:id="rId5"/>
+    <p:sldId id="262" r:id="rId6"/>
+    <p:sldId id="263" r:id="rId7"/>
+    <p:sldId id="264" r:id="rId8"/>
   </p:sldIdLst>
   <p:sldSz cx="12192000" cy="6858000"/>
   <p:notesSz cx="6858000" cy="9144000"/>
@@ -267,7 +267,7 @@
           <a:p>
             <a:fld id="{85321271-6040-2E4F-925C-CA786A662EDA}" type="datetimeFigureOut">
               <a:rPr lang="en-CH" smtClean="0"/>
-              <a:t>06.09.21</a:t>
+              <a:t>19.09.21</a:t>
             </a:fld>
             <a:endParaRPr lang="en-CH"/>
           </a:p>
@@ -467,7 +467,7 @@
           <a:p>
             <a:fld id="{85321271-6040-2E4F-925C-CA786A662EDA}" type="datetimeFigureOut">
               <a:rPr lang="en-CH" smtClean="0"/>
-              <a:t>06.09.21</a:t>
+              <a:t>19.09.21</a:t>
             </a:fld>
             <a:endParaRPr lang="en-CH"/>
           </a:p>
@@ -677,7 +677,7 @@
           <a:p>
             <a:fld id="{85321271-6040-2E4F-925C-CA786A662EDA}" type="datetimeFigureOut">
               <a:rPr lang="en-CH" smtClean="0"/>
-              <a:t>06.09.21</a:t>
+              <a:t>19.09.21</a:t>
             </a:fld>
             <a:endParaRPr lang="en-CH"/>
           </a:p>
@@ -877,7 +877,7 @@
           <a:p>
             <a:fld id="{85321271-6040-2E4F-925C-CA786A662EDA}" type="datetimeFigureOut">
               <a:rPr lang="en-CH" smtClean="0"/>
-              <a:t>06.09.21</a:t>
+              <a:t>19.09.21</a:t>
             </a:fld>
             <a:endParaRPr lang="en-CH"/>
           </a:p>
@@ -1153,7 +1153,7 @@
           <a:p>
             <a:fld id="{85321271-6040-2E4F-925C-CA786A662EDA}" type="datetimeFigureOut">
               <a:rPr lang="en-CH" smtClean="0"/>
-              <a:t>06.09.21</a:t>
+              <a:t>19.09.21</a:t>
             </a:fld>
             <a:endParaRPr lang="en-CH"/>
           </a:p>
@@ -1421,7 +1421,7 @@
           <a:p>
             <a:fld id="{85321271-6040-2E4F-925C-CA786A662EDA}" type="datetimeFigureOut">
               <a:rPr lang="en-CH" smtClean="0"/>
-              <a:t>06.09.21</a:t>
+              <a:t>19.09.21</a:t>
             </a:fld>
             <a:endParaRPr lang="en-CH"/>
           </a:p>
@@ -1836,7 +1836,7 @@
           <a:p>
             <a:fld id="{85321271-6040-2E4F-925C-CA786A662EDA}" type="datetimeFigureOut">
               <a:rPr lang="en-CH" smtClean="0"/>
-              <a:t>06.09.21</a:t>
+              <a:t>19.09.21</a:t>
             </a:fld>
             <a:endParaRPr lang="en-CH"/>
           </a:p>
@@ -1978,7 +1978,7 @@
           <a:p>
             <a:fld id="{85321271-6040-2E4F-925C-CA786A662EDA}" type="datetimeFigureOut">
               <a:rPr lang="en-CH" smtClean="0"/>
-              <a:t>06.09.21</a:t>
+              <a:t>19.09.21</a:t>
             </a:fld>
             <a:endParaRPr lang="en-CH"/>
           </a:p>
@@ -2091,7 +2091,7 @@
           <a:p>
             <a:fld id="{85321271-6040-2E4F-925C-CA786A662EDA}" type="datetimeFigureOut">
               <a:rPr lang="en-CH" smtClean="0"/>
-              <a:t>06.09.21</a:t>
+              <a:t>19.09.21</a:t>
             </a:fld>
             <a:endParaRPr lang="en-CH"/>
           </a:p>
@@ -2404,7 +2404,7 @@
           <a:p>
             <a:fld id="{85321271-6040-2E4F-925C-CA786A662EDA}" type="datetimeFigureOut">
               <a:rPr lang="en-CH" smtClean="0"/>
-              <a:t>06.09.21</a:t>
+              <a:t>19.09.21</a:t>
             </a:fld>
             <a:endParaRPr lang="en-CH"/>
           </a:p>
@@ -2693,7 +2693,7 @@
           <a:p>
             <a:fld id="{85321271-6040-2E4F-925C-CA786A662EDA}" type="datetimeFigureOut">
               <a:rPr lang="en-CH" smtClean="0"/>
-              <a:t>06.09.21</a:t>
+              <a:t>19.09.21</a:t>
             </a:fld>
             <a:endParaRPr lang="en-CH"/>
           </a:p>
@@ -2936,7 +2936,7 @@
           <a:p>
             <a:fld id="{85321271-6040-2E4F-925C-CA786A662EDA}" type="datetimeFigureOut">
               <a:rPr lang="en-CH" smtClean="0"/>
-              <a:t>06.09.21</a:t>
+              <a:t>19.09.21</a:t>
             </a:fld>
             <a:endParaRPr lang="en-CH"/>
           </a:p>
@@ -3409,7 +3409,9 @@
           </a:xfrm>
         </p:spPr>
         <p:txBody>
-          <a:bodyPr/>
+          <a:bodyPr>
+            <a:normAutofit lnSpcReduction="10000"/>
+          </a:bodyPr>
           <a:lstStyle/>
           <a:p>
             <a:r>
@@ -3428,6 +3430,15 @@
               <a:rPr lang="en-CH" dirty="0"/>
               <a:t>Github: </a:t>
             </a:r>
+          </a:p>
+          <a:p>
+            <a:r>
+              <a:rPr lang="en-GB" dirty="0">
+                <a:hlinkClick r:id="rId2"/>
+              </a:rPr>
+              <a:t>https://github.com/gatrikh/project_m05</a:t>
+            </a:r>
+            <a:endParaRPr lang="en-GB" dirty="0"/>
           </a:p>
         </p:txBody>
       </p:sp>
@@ -3508,7 +3519,7 @@
         <p:spPr/>
         <p:txBody>
           <a:bodyPr>
-            <a:normAutofit fontScale="92500" lnSpcReduction="10000"/>
+            <a:normAutofit fontScale="92500"/>
           </a:bodyPr>
           <a:lstStyle/>
           <a:p>
@@ -3562,7 +3573,7 @@
             </a:r>
             <a:r>
               <a:rPr lang="en-GB" dirty="0"/>
-              <a:t> attack…) for 70 different type of network services (http, smtp, ftp...) </a:t>
+              <a:t> attack…). </a:t>
             </a:r>
           </a:p>
           <a:p>
@@ -3618,7 +3629,7 @@
           <p:cNvPr id="2" name="Title 1">
             <a:extLst>
               <a:ext uri="{FF2B5EF4-FFF2-40B4-BE49-F238E27FC236}">
-                <a16:creationId xmlns:a16="http://schemas.microsoft.com/office/drawing/2014/main" id="{8D809AF9-9460-C84D-B987-AB5DE8DACBED}"/>
+                <a16:creationId xmlns:a16="http://schemas.microsoft.com/office/drawing/2014/main" id="{73B34BCB-1FC3-D442-BF89-B69D3E2092FB}"/>
               </a:ext>
             </a:extLst>
           </p:cNvPr>
@@ -3636,7 +3647,7 @@
           <a:p>
             <a:r>
               <a:rPr lang="en-CH" b="1" u="sng" dirty="0"/>
-              <a:t>Our dataset</a:t>
+              <a:t>The hypothesis</a:t>
             </a:r>
           </a:p>
         </p:txBody>
@@ -3646,7 +3657,7 @@
           <p:cNvPr id="3" name="Content Placeholder 2">
             <a:extLst>
               <a:ext uri="{FF2B5EF4-FFF2-40B4-BE49-F238E27FC236}">
-                <a16:creationId xmlns:a16="http://schemas.microsoft.com/office/drawing/2014/main" id="{83278BAE-92D8-2445-B5D9-2709310CE856}"/>
+                <a16:creationId xmlns:a16="http://schemas.microsoft.com/office/drawing/2014/main" id="{1DF4698C-3A39-EA45-8D8D-7B3220F82C70}"/>
               </a:ext>
             </a:extLst>
           </p:cNvPr>
@@ -3660,489 +3671,64 @@
         <p:spPr>
           <a:xfrm>
             <a:off x="838200" y="1825625"/>
-            <a:ext cx="10515600" cy="2126336"/>
+            <a:ext cx="10515600" cy="3854928"/>
           </a:xfrm>
         </p:spPr>
         <p:txBody>
           <a:bodyPr>
-            <a:normAutofit/>
+            <a:normAutofit fontScale="92500" lnSpcReduction="20000"/>
           </a:bodyPr>
           <a:lstStyle/>
           <a:p>
+            <a:pPr marL="0" indent="0">
+              <a:buNone/>
+            </a:pPr>
             <a:r>
               <a:rPr lang="en-CH" dirty="0"/>
-              <a:t>A subset of the original one. </a:t>
-            </a:r>
-          </a:p>
-          <a:p>
+              <a:t>Statements: </a:t>
+            </a:r>
+          </a:p>
+          <a:p>
+            <a:r>
+              <a:rPr lang="en-CH" dirty="0"/>
+              <a:t>In the 23 labels, 1 label is representing a normal connection and 22 a type of network attack. </a:t>
+            </a:r>
+          </a:p>
+          <a:p>
+            <a:r>
+              <a:rPr lang="en-CH" dirty="0"/>
+              <a:t>The normal connections represent 20% of the samples of the whole set. </a:t>
+            </a:r>
+          </a:p>
+          <a:p>
+            <a:r>
+              <a:rPr lang="en-CH" dirty="0"/>
+              <a:t>We believe it is possible to classify those connections using the 41 features available. </a:t>
+            </a:r>
+          </a:p>
+          <a:p>
+            <a:pPr marL="0" indent="0">
+              <a:buNone/>
+            </a:pPr>
+            <a:endParaRPr lang="en-CH" b="1" dirty="0"/>
+          </a:p>
+          <a:p>
+            <a:pPr marL="0" indent="0">
+              <a:buNone/>
+            </a:pPr>
+            <a:r>
+              <a:rPr lang="en-CH" dirty="0"/>
+              <a:t>Hypothesis: </a:t>
+            </a:r>
+            <a:endParaRPr lang="en-CH" b="1" dirty="0"/>
+          </a:p>
+          <a:p>
+            <a:pPr marL="0" indent="0">
+              <a:buNone/>
+            </a:pPr>
             <a:r>
               <a:rPr lang="en-CH" b="1" dirty="0"/>
-              <a:t>Only the http service is kept. </a:t>
-            </a:r>
-            <a:r>
-              <a:rPr lang="en-CH" dirty="0"/>
-              <a:t>T</a:t>
-            </a:r>
-            <a:r>
-              <a:rPr lang="en-GB" dirty="0"/>
-              <a:t>h</a:t>
-            </a:r>
-            <a:r>
-              <a:rPr lang="en-CH" dirty="0"/>
-              <a:t>is represents 623’091 samples. </a:t>
-            </a:r>
-          </a:p>
-          <a:p>
-            <a:r>
-              <a:rPr lang="en-CH" dirty="0"/>
-              <a:t>There are no more 70 different labels, but only 8 labels. </a:t>
-            </a:r>
-          </a:p>
-          <a:p>
-            <a:r>
-              <a:rPr lang="en-CH" b="1" dirty="0"/>
-              <a:t>We merge all abnormal connections into a unique label. </a:t>
-            </a:r>
-          </a:p>
-          <a:p>
-            <a:endParaRPr lang="en-CH" dirty="0"/>
-          </a:p>
-          <a:p>
-            <a:endParaRPr lang="en-CH" dirty="0"/>
-          </a:p>
-          <a:p>
-            <a:endParaRPr lang="en-CH" dirty="0"/>
-          </a:p>
-          <a:p>
-            <a:endParaRPr lang="en-CH" dirty="0"/>
-          </a:p>
-          <a:p>
-            <a:endParaRPr lang="en-CH" dirty="0"/>
-          </a:p>
-          <a:p>
-            <a:endParaRPr lang="en-CH" dirty="0"/>
-          </a:p>
-          <a:p>
-            <a:endParaRPr lang="en-CH" dirty="0"/>
-          </a:p>
-          <a:p>
-            <a:pPr marL="0" indent="0">
-              <a:buNone/>
-            </a:pPr>
-            <a:endParaRPr lang="en-CH" dirty="0"/>
-          </a:p>
-        </p:txBody>
-      </p:sp>
-      <p:pic>
-        <p:nvPicPr>
-          <p:cNvPr id="5" name="Picture 4">
-            <a:extLst>
-              <a:ext uri="{FF2B5EF4-FFF2-40B4-BE49-F238E27FC236}">
-                <a16:creationId xmlns:a16="http://schemas.microsoft.com/office/drawing/2014/main" id="{FE300F44-F597-9446-B914-14E7A0296DC5}"/>
-              </a:ext>
-            </a:extLst>
-          </p:cNvPr>
-          <p:cNvPicPr>
-            <a:picLocks noChangeAspect="1"/>
-          </p:cNvPicPr>
-          <p:nvPr/>
-        </p:nvPicPr>
-        <p:blipFill>
-          <a:blip r:embed="rId2"/>
-          <a:stretch>
-            <a:fillRect/>
-          </a:stretch>
-        </p:blipFill>
-        <p:spPr>
-          <a:xfrm>
-            <a:off x="1167120" y="3886135"/>
-            <a:ext cx="2779927" cy="2773080"/>
-          </a:xfrm>
-          <a:prstGeom prst="rect">
-            <a:avLst/>
-          </a:prstGeom>
-        </p:spPr>
-      </p:pic>
-      <p:sp>
-        <p:nvSpPr>
-          <p:cNvPr id="6" name="Right Bracket 5">
-            <a:extLst>
-              <a:ext uri="{FF2B5EF4-FFF2-40B4-BE49-F238E27FC236}">
-                <a16:creationId xmlns:a16="http://schemas.microsoft.com/office/drawing/2014/main" id="{583C60C4-5C03-FA44-9B53-6117E6A11B1D}"/>
-              </a:ext>
-            </a:extLst>
-          </p:cNvPr>
-          <p:cNvSpPr/>
-          <p:nvPr/>
-        </p:nvSpPr>
-        <p:spPr>
-          <a:xfrm>
-            <a:off x="3387868" y="4316765"/>
-            <a:ext cx="415077" cy="1911819"/>
-          </a:xfrm>
-          <a:prstGeom prst="rightBracket">
-            <a:avLst/>
-          </a:prstGeom>
-          <a:noFill/>
-          <a:ln w="38100">
-            <a:solidFill>
-              <a:srgbClr val="FF0000"/>
-            </a:solidFill>
-          </a:ln>
-        </p:spPr>
-        <p:style>
-          <a:lnRef idx="1">
-            <a:schemeClr val="accent1"/>
-          </a:lnRef>
-          <a:fillRef idx="0">
-            <a:schemeClr val="accent1"/>
-          </a:fillRef>
-          <a:effectRef idx="0">
-            <a:schemeClr val="accent1"/>
-          </a:effectRef>
-          <a:fontRef idx="minor">
-            <a:schemeClr val="tx1"/>
-          </a:fontRef>
-        </p:style>
-        <p:txBody>
-          <a:bodyPr rtlCol="0" anchor="ctr"/>
-          <a:lstStyle/>
-          <a:p>
-            <a:pPr algn="ctr"/>
-            <a:endParaRPr lang="en-CH"/>
-          </a:p>
-        </p:txBody>
-      </p:sp>
-      <p:cxnSp>
-        <p:nvCxnSpPr>
-          <p:cNvPr id="8" name="Straight Arrow Connector 7">
-            <a:extLst>
-              <a:ext uri="{FF2B5EF4-FFF2-40B4-BE49-F238E27FC236}">
-                <a16:creationId xmlns:a16="http://schemas.microsoft.com/office/drawing/2014/main" id="{3321E0A7-F0B8-A047-A5F0-F57D8E7DBAF2}"/>
-              </a:ext>
-            </a:extLst>
-          </p:cNvPr>
-          <p:cNvCxnSpPr/>
-          <p:nvPr/>
-        </p:nvCxnSpPr>
-        <p:spPr>
-          <a:xfrm>
-            <a:off x="3387868" y="4040997"/>
-            <a:ext cx="1260389" cy="0"/>
-          </a:xfrm>
-          <a:prstGeom prst="straightConnector1">
-            <a:avLst/>
-          </a:prstGeom>
-          <a:ln w="38100">
-            <a:solidFill>
-              <a:srgbClr val="FF0000"/>
-            </a:solidFill>
-            <a:tailEnd type="triangle"/>
-          </a:ln>
-        </p:spPr>
-        <p:style>
-          <a:lnRef idx="1">
-            <a:schemeClr val="accent1"/>
-          </a:lnRef>
-          <a:fillRef idx="0">
-            <a:schemeClr val="accent1"/>
-          </a:fillRef>
-          <a:effectRef idx="0">
-            <a:schemeClr val="accent1"/>
-          </a:effectRef>
-          <a:fontRef idx="minor">
-            <a:schemeClr val="tx1"/>
-          </a:fontRef>
-        </p:style>
-      </p:cxnSp>
-      <p:cxnSp>
-        <p:nvCxnSpPr>
-          <p:cNvPr id="9" name="Straight Arrow Connector 8">
-            <a:extLst>
-              <a:ext uri="{FF2B5EF4-FFF2-40B4-BE49-F238E27FC236}">
-                <a16:creationId xmlns:a16="http://schemas.microsoft.com/office/drawing/2014/main" id="{316D12A0-F237-984B-BD99-728510A5533D}"/>
-              </a:ext>
-            </a:extLst>
-          </p:cNvPr>
-          <p:cNvCxnSpPr>
-            <a:cxnSpLocks/>
-          </p:cNvCxnSpPr>
-          <p:nvPr/>
-        </p:nvCxnSpPr>
-        <p:spPr>
-          <a:xfrm>
-            <a:off x="3802945" y="5272792"/>
-            <a:ext cx="845312" cy="0"/>
-          </a:xfrm>
-          <a:prstGeom prst="straightConnector1">
-            <a:avLst/>
-          </a:prstGeom>
-          <a:ln w="38100">
-            <a:solidFill>
-              <a:srgbClr val="FF0000"/>
-            </a:solidFill>
-            <a:tailEnd type="triangle"/>
-          </a:ln>
-        </p:spPr>
-        <p:style>
-          <a:lnRef idx="1">
-            <a:schemeClr val="accent1"/>
-          </a:lnRef>
-          <a:fillRef idx="0">
-            <a:schemeClr val="accent1"/>
-          </a:fillRef>
-          <a:effectRef idx="0">
-            <a:schemeClr val="accent1"/>
-          </a:effectRef>
-          <a:fontRef idx="minor">
-            <a:schemeClr val="tx1"/>
-          </a:fontRef>
-        </p:style>
-      </p:cxnSp>
-      <p:sp>
-        <p:nvSpPr>
-          <p:cNvPr id="12" name="TextBox 11">
-            <a:extLst>
-              <a:ext uri="{FF2B5EF4-FFF2-40B4-BE49-F238E27FC236}">
-                <a16:creationId xmlns:a16="http://schemas.microsoft.com/office/drawing/2014/main" id="{6BAADE00-D9B5-FE40-8EBA-9D0341904FB6}"/>
-              </a:ext>
-            </a:extLst>
-          </p:cNvPr>
-          <p:cNvSpPr txBox="1"/>
-          <p:nvPr/>
-        </p:nvSpPr>
-        <p:spPr>
-          <a:xfrm>
-            <a:off x="4648257" y="3856173"/>
-            <a:ext cx="2559162" cy="369332"/>
-          </a:xfrm>
-          <a:prstGeom prst="rect">
-            <a:avLst/>
-          </a:prstGeom>
-          <a:noFill/>
-        </p:spPr>
-        <p:txBody>
-          <a:bodyPr wrap="none" rtlCol="0">
-            <a:spAutoFit/>
-          </a:bodyPr>
-          <a:lstStyle/>
-          <a:p>
-            <a:r>
-              <a:rPr lang="en-CH" b="1" dirty="0"/>
-              <a:t>Normal http connections</a:t>
-            </a:r>
-          </a:p>
-        </p:txBody>
-      </p:sp>
-      <p:sp>
-        <p:nvSpPr>
-          <p:cNvPr id="13" name="TextBox 12">
-            <a:extLst>
-              <a:ext uri="{FF2B5EF4-FFF2-40B4-BE49-F238E27FC236}">
-                <a16:creationId xmlns:a16="http://schemas.microsoft.com/office/drawing/2014/main" id="{597D2261-9D63-BF4D-900E-C25E9B805B31}"/>
-              </a:ext>
-            </a:extLst>
-          </p:cNvPr>
-          <p:cNvSpPr txBox="1"/>
-          <p:nvPr/>
-        </p:nvSpPr>
-        <p:spPr>
-          <a:xfrm>
-            <a:off x="4648257" y="5088008"/>
-            <a:ext cx="3946337" cy="369332"/>
-          </a:xfrm>
-          <a:prstGeom prst="rect">
-            <a:avLst/>
-          </a:prstGeom>
-          <a:noFill/>
-        </p:spPr>
-        <p:txBody>
-          <a:bodyPr wrap="none" rtlCol="0">
-            <a:spAutoFit/>
-          </a:bodyPr>
-          <a:lstStyle/>
-          <a:p>
-            <a:r>
-              <a:rPr lang="en-CH" b="1" dirty="0"/>
-              <a:t>Abnormal (intrusive) http connections</a:t>
-            </a:r>
-          </a:p>
-        </p:txBody>
-      </p:sp>
-      <p:sp>
-        <p:nvSpPr>
-          <p:cNvPr id="15" name="Right Arrow 14">
-            <a:extLst>
-              <a:ext uri="{FF2B5EF4-FFF2-40B4-BE49-F238E27FC236}">
-                <a16:creationId xmlns:a16="http://schemas.microsoft.com/office/drawing/2014/main" id="{BF16FE37-D49B-B747-A3F2-2AE805BF49A0}"/>
-              </a:ext>
-            </a:extLst>
-          </p:cNvPr>
-          <p:cNvSpPr/>
-          <p:nvPr/>
-        </p:nvSpPr>
-        <p:spPr>
-          <a:xfrm>
-            <a:off x="7207419" y="4029686"/>
-            <a:ext cx="463463" cy="76235"/>
-          </a:xfrm>
-          <a:prstGeom prst="rightArrow">
-            <a:avLst/>
-          </a:prstGeom>
-          <a:solidFill>
-            <a:srgbClr val="FF0000"/>
-          </a:solidFill>
-          <a:ln>
-            <a:solidFill>
-              <a:srgbClr val="FF0000"/>
-            </a:solidFill>
-          </a:ln>
-        </p:spPr>
-        <p:style>
-          <a:lnRef idx="2">
-            <a:schemeClr val="accent1">
-              <a:shade val="50000"/>
-            </a:schemeClr>
-          </a:lnRef>
-          <a:fillRef idx="1">
-            <a:schemeClr val="accent1"/>
-          </a:fillRef>
-          <a:effectRef idx="0">
-            <a:schemeClr val="accent1"/>
-          </a:effectRef>
-          <a:fontRef idx="minor">
-            <a:schemeClr val="lt1"/>
-          </a:fontRef>
-        </p:style>
-        <p:txBody>
-          <a:bodyPr rtlCol="0" anchor="ctr"/>
-          <a:lstStyle/>
-          <a:p>
-            <a:pPr algn="ctr"/>
-            <a:endParaRPr lang="en-CH"/>
-          </a:p>
-        </p:txBody>
-      </p:sp>
-      <p:sp>
-        <p:nvSpPr>
-          <p:cNvPr id="16" name="Right Arrow 15">
-            <a:extLst>
-              <a:ext uri="{FF2B5EF4-FFF2-40B4-BE49-F238E27FC236}">
-                <a16:creationId xmlns:a16="http://schemas.microsoft.com/office/drawing/2014/main" id="{8D96FD80-6DCE-DE4B-B7FF-39D2E1C88C82}"/>
-              </a:ext>
-            </a:extLst>
-          </p:cNvPr>
-          <p:cNvSpPr/>
-          <p:nvPr/>
-        </p:nvSpPr>
-        <p:spPr>
-          <a:xfrm>
-            <a:off x="8430795" y="5248634"/>
-            <a:ext cx="463463" cy="76235"/>
-          </a:xfrm>
-          <a:prstGeom prst="rightArrow">
-            <a:avLst/>
-          </a:prstGeom>
-          <a:solidFill>
-            <a:srgbClr val="FF0000"/>
-          </a:solidFill>
-          <a:ln>
-            <a:solidFill>
-              <a:srgbClr val="FF0000"/>
-            </a:solidFill>
-          </a:ln>
-        </p:spPr>
-        <p:style>
-          <a:lnRef idx="2">
-            <a:schemeClr val="accent1">
-              <a:shade val="50000"/>
-            </a:schemeClr>
-          </a:lnRef>
-          <a:fillRef idx="1">
-            <a:schemeClr val="accent1"/>
-          </a:fillRef>
-          <a:effectRef idx="0">
-            <a:schemeClr val="accent1"/>
-          </a:effectRef>
-          <a:fontRef idx="minor">
-            <a:schemeClr val="lt1"/>
-          </a:fontRef>
-        </p:style>
-        <p:txBody>
-          <a:bodyPr rtlCol="0" anchor="ctr"/>
-          <a:lstStyle/>
-          <a:p>
-            <a:pPr algn="ctr"/>
-            <a:endParaRPr lang="en-CH"/>
-          </a:p>
-        </p:txBody>
-      </p:sp>
-      <p:sp>
-        <p:nvSpPr>
-          <p:cNvPr id="17" name="TextBox 16">
-            <a:extLst>
-              <a:ext uri="{FF2B5EF4-FFF2-40B4-BE49-F238E27FC236}">
-                <a16:creationId xmlns:a16="http://schemas.microsoft.com/office/drawing/2014/main" id="{386EC7B8-B182-E04B-897D-B81CF3A7EFCE}"/>
-              </a:ext>
-            </a:extLst>
-          </p:cNvPr>
-          <p:cNvSpPr txBox="1"/>
-          <p:nvPr/>
-        </p:nvSpPr>
-        <p:spPr>
-          <a:xfrm>
-            <a:off x="7670882" y="3886135"/>
-            <a:ext cx="861133" cy="369332"/>
-          </a:xfrm>
-          <a:prstGeom prst="rect">
-            <a:avLst/>
-          </a:prstGeom>
-          <a:noFill/>
-        </p:spPr>
-        <p:txBody>
-          <a:bodyPr wrap="none" rtlCol="0">
-            <a:spAutoFit/>
-          </a:bodyPr>
-          <a:lstStyle/>
-          <a:p>
-            <a:r>
-              <a:rPr lang="en-CH" b="1" dirty="0"/>
-              <a:t>Label 0</a:t>
-            </a:r>
-          </a:p>
-        </p:txBody>
-      </p:sp>
-      <p:sp>
-        <p:nvSpPr>
-          <p:cNvPr id="18" name="TextBox 17">
-            <a:extLst>
-              <a:ext uri="{FF2B5EF4-FFF2-40B4-BE49-F238E27FC236}">
-                <a16:creationId xmlns:a16="http://schemas.microsoft.com/office/drawing/2014/main" id="{43B95F0A-5165-EC40-B496-B943B03F7B16}"/>
-              </a:ext>
-            </a:extLst>
-          </p:cNvPr>
-          <p:cNvSpPr txBox="1"/>
-          <p:nvPr/>
-        </p:nvSpPr>
-        <p:spPr>
-          <a:xfrm>
-            <a:off x="8894258" y="5091145"/>
-            <a:ext cx="861133" cy="369332"/>
-          </a:xfrm>
-          <a:prstGeom prst="rect">
-            <a:avLst/>
-          </a:prstGeom>
-          <a:noFill/>
-        </p:spPr>
-        <p:txBody>
-          <a:bodyPr wrap="none" rtlCol="0">
-            <a:spAutoFit/>
-          </a:bodyPr>
-          <a:lstStyle/>
-          <a:p>
-            <a:r>
-              <a:rPr lang="en-CH" b="1" dirty="0"/>
-              <a:t>Label 1</a:t>
+              <a:t>“We can achieve a good classification accuracy (&gt; 95% on the test set) in classifying the network connections into the correct labels.” </a:t>
             </a:r>
           </a:p>
         </p:txBody>
@@ -4150,7 +3736,7 @@
     </p:spTree>
     <p:extLst>
       <p:ext uri="{BB962C8B-B14F-4D97-AF65-F5344CB8AC3E}">
-        <p14:creationId xmlns:p14="http://schemas.microsoft.com/office/powerpoint/2010/main" val="747540687"/>
+        <p14:creationId xmlns:p14="http://schemas.microsoft.com/office/powerpoint/2010/main" val="1697104218"/>
       </p:ext>
     </p:extLst>
   </p:cSld>
@@ -4182,145 +3768,6 @@
           <p:cNvPr id="2" name="Title 1">
             <a:extLst>
               <a:ext uri="{FF2B5EF4-FFF2-40B4-BE49-F238E27FC236}">
-                <a16:creationId xmlns:a16="http://schemas.microsoft.com/office/drawing/2014/main" id="{73B34BCB-1FC3-D442-BF89-B69D3E2092FB}"/>
-              </a:ext>
-            </a:extLst>
-          </p:cNvPr>
-          <p:cNvSpPr>
-            <a:spLocks noGrp="1"/>
-          </p:cNvSpPr>
-          <p:nvPr>
-            <p:ph type="title"/>
-          </p:nvPr>
-        </p:nvSpPr>
-        <p:spPr/>
-        <p:txBody>
-          <a:bodyPr/>
-          <a:lstStyle/>
-          <a:p>
-            <a:r>
-              <a:rPr lang="en-CH" b="1" u="sng" dirty="0"/>
-              <a:t>The hypothesis</a:t>
-            </a:r>
-          </a:p>
-        </p:txBody>
-      </p:sp>
-      <p:sp>
-        <p:nvSpPr>
-          <p:cNvPr id="3" name="Content Placeholder 2">
-            <a:extLst>
-              <a:ext uri="{FF2B5EF4-FFF2-40B4-BE49-F238E27FC236}">
-                <a16:creationId xmlns:a16="http://schemas.microsoft.com/office/drawing/2014/main" id="{1DF4698C-3A39-EA45-8D8D-7B3220F82C70}"/>
-              </a:ext>
-            </a:extLst>
-          </p:cNvPr>
-          <p:cNvSpPr>
-            <a:spLocks noGrp="1"/>
-          </p:cNvSpPr>
-          <p:nvPr>
-            <p:ph idx="1"/>
-          </p:nvPr>
-        </p:nvSpPr>
-        <p:spPr>
-          <a:xfrm>
-            <a:off x="838200" y="1825625"/>
-            <a:ext cx="10515600" cy="3854928"/>
-          </a:xfrm>
-        </p:spPr>
-        <p:txBody>
-          <a:bodyPr>
-            <a:normAutofit fontScale="92500" lnSpcReduction="20000"/>
-          </a:bodyPr>
-          <a:lstStyle/>
-          <a:p>
-            <a:pPr marL="0" indent="0">
-              <a:buNone/>
-            </a:pPr>
-            <a:r>
-              <a:rPr lang="en-CH" dirty="0"/>
-              <a:t>Statements: </a:t>
-            </a:r>
-          </a:p>
-          <a:p>
-            <a:r>
-              <a:rPr lang="en-CH" dirty="0"/>
-              <a:t>There are 619’046 normal samples for 4’045 abnormal ones. </a:t>
-            </a:r>
-          </a:p>
-          <a:p>
-            <a:r>
-              <a:rPr lang="en-CH" dirty="0"/>
-              <a:t>The abnormal ones represents 0.65% of the total http connections. </a:t>
-            </a:r>
-          </a:p>
-          <a:p>
-            <a:r>
-              <a:rPr lang="en-CH" dirty="0"/>
-              <a:t>We believe it is possible to classify those connections using the 41 features available. </a:t>
-            </a:r>
-          </a:p>
-          <a:p>
-            <a:pPr marL="0" indent="0">
-              <a:buNone/>
-            </a:pPr>
-            <a:endParaRPr lang="en-CH" b="1" dirty="0"/>
-          </a:p>
-          <a:p>
-            <a:pPr marL="0" indent="0">
-              <a:buNone/>
-            </a:pPr>
-            <a:r>
-              <a:rPr lang="en-CH" dirty="0"/>
-              <a:t>Hypothesis: </a:t>
-            </a:r>
-            <a:endParaRPr lang="en-CH" b="1" dirty="0"/>
-          </a:p>
-          <a:p>
-            <a:pPr marL="0" indent="0">
-              <a:buNone/>
-            </a:pPr>
-            <a:r>
-              <a:rPr lang="en-CH" b="1" dirty="0"/>
-              <a:t>“We can achieve a good classification accuracy (&gt; 90% on the test set) between normal (0) and abnormal (1) http connections in order to build an automatic network intrusion http detector.”</a:t>
-            </a:r>
-          </a:p>
-        </p:txBody>
-      </p:sp>
-    </p:spTree>
-    <p:extLst>
-      <p:ext uri="{BB962C8B-B14F-4D97-AF65-F5344CB8AC3E}">
-        <p14:creationId xmlns:p14="http://schemas.microsoft.com/office/powerpoint/2010/main" val="1697104218"/>
-      </p:ext>
-    </p:extLst>
-  </p:cSld>
-  <p:clrMapOvr>
-    <a:masterClrMapping/>
-  </p:clrMapOvr>
-</p:sld>
-</file>
-
-<file path=ppt/slides/slide5.xml><?xml version="1.0" encoding="utf-8"?>
-<p:sld xmlns:a="http://schemas.openxmlformats.org/drawingml/2006/main" xmlns:r="http://schemas.openxmlformats.org/officeDocument/2006/relationships" xmlns:p="http://schemas.openxmlformats.org/presentationml/2006/main">
-  <p:cSld>
-    <p:spTree>
-      <p:nvGrpSpPr>
-        <p:cNvPr id="1" name=""/>
-        <p:cNvGrpSpPr/>
-        <p:nvPr/>
-      </p:nvGrpSpPr>
-      <p:grpSpPr>
-        <a:xfrm>
-          <a:off x="0" y="0"/>
-          <a:ext cx="0" cy="0"/>
-          <a:chOff x="0" y="0"/>
-          <a:chExt cx="0" cy="0"/>
-        </a:xfrm>
-      </p:grpSpPr>
-      <p:sp>
-        <p:nvSpPr>
-          <p:cNvPr id="2" name="Title 1">
-            <a:extLst>
-              <a:ext uri="{FF2B5EF4-FFF2-40B4-BE49-F238E27FC236}">
                 <a16:creationId xmlns:a16="http://schemas.microsoft.com/office/drawing/2014/main" id="{92482DA4-79F1-5A4A-A8E4-CC5BE4EFF066}"/>
               </a:ext>
             </a:extLst>
@@ -4346,10 +3793,10 @@
       </p:sp>
       <p:pic>
         <p:nvPicPr>
-          <p:cNvPr id="15" name="Picture 14">
-            <a:extLst>
-              <a:ext uri="{FF2B5EF4-FFF2-40B4-BE49-F238E27FC236}">
-                <a16:creationId xmlns:a16="http://schemas.microsoft.com/office/drawing/2014/main" id="{AB8871AB-61F5-B74C-A51B-D3C22D680F4F}"/>
+          <p:cNvPr id="4" name="Picture 3" descr="Text&#10;&#10;Description automatically generated">
+            <a:extLst>
+              <a:ext uri="{FF2B5EF4-FFF2-40B4-BE49-F238E27FC236}">
+                <a16:creationId xmlns:a16="http://schemas.microsoft.com/office/drawing/2014/main" id="{23C96291-C05D-0A4D-885A-00C9AA36DC6C}"/>
               </a:ext>
             </a:extLst>
           </p:cNvPr>
@@ -4366,8 +3813,8 @@
         </p:blipFill>
         <p:spPr>
           <a:xfrm>
-            <a:off x="582460" y="2212784"/>
-            <a:ext cx="11202072" cy="4280091"/>
+            <a:off x="1047549" y="1690688"/>
+            <a:ext cx="10096901" cy="4937837"/>
           </a:xfrm>
           <a:prstGeom prst="rect">
             <a:avLst/>
@@ -4387,7 +3834,7 @@
 </p:sld>
 </file>
 
-<file path=ppt/slides/slide6.xml><?xml version="1.0" encoding="utf-8"?>
+<file path=ppt/slides/slide5.xml><?xml version="1.0" encoding="utf-8"?>
 <p:sld xmlns:a="http://schemas.openxmlformats.org/drawingml/2006/main" xmlns:r="http://schemas.openxmlformats.org/officeDocument/2006/relationships" xmlns:p="http://schemas.openxmlformats.org/presentationml/2006/main">
   <p:cSld>
     <p:spTree>
@@ -5243,6 +4690,303 @@
 </p:sld>
 </file>
 
+<file path=ppt/slides/slide6.xml><?xml version="1.0" encoding="utf-8"?>
+<p:sld xmlns:a="http://schemas.openxmlformats.org/drawingml/2006/main" xmlns:r="http://schemas.openxmlformats.org/officeDocument/2006/relationships" xmlns:p="http://schemas.openxmlformats.org/presentationml/2006/main">
+  <p:cSld>
+    <p:spTree>
+      <p:nvGrpSpPr>
+        <p:cNvPr id="1" name=""/>
+        <p:cNvGrpSpPr/>
+        <p:nvPr/>
+      </p:nvGrpSpPr>
+      <p:grpSpPr>
+        <a:xfrm>
+          <a:off x="0" y="0"/>
+          <a:ext cx="0" cy="0"/>
+          <a:chOff x="0" y="0"/>
+          <a:chExt cx="0" cy="0"/>
+        </a:xfrm>
+      </p:grpSpPr>
+      <p:sp>
+        <p:nvSpPr>
+          <p:cNvPr id="2" name="Title 1">
+            <a:extLst>
+              <a:ext uri="{FF2B5EF4-FFF2-40B4-BE49-F238E27FC236}">
+                <a16:creationId xmlns:a16="http://schemas.microsoft.com/office/drawing/2014/main" id="{CF2DE2F5-05C4-EC48-BB6A-68F63F7649E0}"/>
+              </a:ext>
+            </a:extLst>
+          </p:cNvPr>
+          <p:cNvSpPr>
+            <a:spLocks noGrp="1"/>
+          </p:cNvSpPr>
+          <p:nvPr>
+            <p:ph type="title"/>
+          </p:nvPr>
+        </p:nvSpPr>
+        <p:spPr/>
+        <p:txBody>
+          <a:bodyPr/>
+          <a:lstStyle/>
+          <a:p>
+            <a:r>
+              <a:rPr lang="en-CH" b="1" u="sng" dirty="0"/>
+              <a:t>Unit testing</a:t>
+            </a:r>
+          </a:p>
+        </p:txBody>
+      </p:sp>
+      <p:pic>
+        <p:nvPicPr>
+          <p:cNvPr id="9" name="Content Placeholder 8" descr="A screenshot of a computer&#10;&#10;Description automatically generated with medium confidence">
+            <a:extLst>
+              <a:ext uri="{FF2B5EF4-FFF2-40B4-BE49-F238E27FC236}">
+                <a16:creationId xmlns:a16="http://schemas.microsoft.com/office/drawing/2014/main" id="{3C29E91E-D24A-1D41-A81A-4013D8099322}"/>
+              </a:ext>
+            </a:extLst>
+          </p:cNvPr>
+          <p:cNvPicPr>
+            <a:picLocks noGrp="1" noChangeAspect="1"/>
+          </p:cNvPicPr>
+          <p:nvPr>
+            <p:ph idx="1"/>
+          </p:nvPr>
+        </p:nvPicPr>
+        <p:blipFill rotWithShape="1">
+          <a:blip r:embed="rId2"/>
+          <a:srcRect l="2646" r="654"/>
+          <a:stretch/>
+        </p:blipFill>
+        <p:spPr>
+          <a:xfrm>
+            <a:off x="922665" y="1491032"/>
+            <a:ext cx="3527415" cy="5001843"/>
+          </a:xfrm>
+        </p:spPr>
+      </p:pic>
+      <p:sp>
+        <p:nvSpPr>
+          <p:cNvPr id="10" name="Content Placeholder 2">
+            <a:extLst>
+              <a:ext uri="{FF2B5EF4-FFF2-40B4-BE49-F238E27FC236}">
+                <a16:creationId xmlns:a16="http://schemas.microsoft.com/office/drawing/2014/main" id="{4DD26E11-6A91-1B4E-8646-871310983A02}"/>
+              </a:ext>
+            </a:extLst>
+          </p:cNvPr>
+          <p:cNvSpPr txBox="1">
+            <a:spLocks/>
+          </p:cNvSpPr>
+          <p:nvPr/>
+        </p:nvSpPr>
+        <p:spPr>
+          <a:xfrm>
+            <a:off x="5095581" y="1491032"/>
+            <a:ext cx="6667794" cy="4375150"/>
+          </a:xfrm>
+          <a:prstGeom prst="rect">
+            <a:avLst/>
+          </a:prstGeom>
+        </p:spPr>
+        <p:txBody>
+          <a:bodyPr vert="horz" lIns="91440" tIns="45720" rIns="91440" bIns="45720" rtlCol="0">
+            <a:normAutofit/>
+          </a:bodyPr>
+          <a:lstStyle>
+            <a:lvl1pPr marL="228600" indent="-228600" algn="l" defTabSz="914400" rtl="0" eaLnBrk="1" latinLnBrk="0" hangingPunct="1">
+              <a:lnSpc>
+                <a:spcPct val="90000"/>
+              </a:lnSpc>
+              <a:spcBef>
+                <a:spcPts val="1000"/>
+              </a:spcBef>
+              <a:buFont typeface="Arial" panose="020B0604020202020204" pitchFamily="34" charset="0"/>
+              <a:buChar char="•"/>
+              <a:defRPr sz="2800" kern="1200">
+                <a:solidFill>
+                  <a:schemeClr val="tx1"/>
+                </a:solidFill>
+                <a:latin typeface="+mn-lt"/>
+                <a:ea typeface="+mn-ea"/>
+                <a:cs typeface="+mn-cs"/>
+              </a:defRPr>
+            </a:lvl1pPr>
+            <a:lvl2pPr marL="685800" indent="-228600" algn="l" defTabSz="914400" rtl="0" eaLnBrk="1" latinLnBrk="0" hangingPunct="1">
+              <a:lnSpc>
+                <a:spcPct val="90000"/>
+              </a:lnSpc>
+              <a:spcBef>
+                <a:spcPts val="500"/>
+              </a:spcBef>
+              <a:buFont typeface="Arial" panose="020B0604020202020204" pitchFamily="34" charset="0"/>
+              <a:buChar char="•"/>
+              <a:defRPr sz="2400" kern="1200">
+                <a:solidFill>
+                  <a:schemeClr val="tx1"/>
+                </a:solidFill>
+                <a:latin typeface="+mn-lt"/>
+                <a:ea typeface="+mn-ea"/>
+                <a:cs typeface="+mn-cs"/>
+              </a:defRPr>
+            </a:lvl2pPr>
+            <a:lvl3pPr marL="1143000" indent="-228600" algn="l" defTabSz="914400" rtl="0" eaLnBrk="1" latinLnBrk="0" hangingPunct="1">
+              <a:lnSpc>
+                <a:spcPct val="90000"/>
+              </a:lnSpc>
+              <a:spcBef>
+                <a:spcPts val="500"/>
+              </a:spcBef>
+              <a:buFont typeface="Arial" panose="020B0604020202020204" pitchFamily="34" charset="0"/>
+              <a:buChar char="•"/>
+              <a:defRPr sz="2000" kern="1200">
+                <a:solidFill>
+                  <a:schemeClr val="tx1"/>
+                </a:solidFill>
+                <a:latin typeface="+mn-lt"/>
+                <a:ea typeface="+mn-ea"/>
+                <a:cs typeface="+mn-cs"/>
+              </a:defRPr>
+            </a:lvl3pPr>
+            <a:lvl4pPr marL="1600200" indent="-228600" algn="l" defTabSz="914400" rtl="0" eaLnBrk="1" latinLnBrk="0" hangingPunct="1">
+              <a:lnSpc>
+                <a:spcPct val="90000"/>
+              </a:lnSpc>
+              <a:spcBef>
+                <a:spcPts val="500"/>
+              </a:spcBef>
+              <a:buFont typeface="Arial" panose="020B0604020202020204" pitchFamily="34" charset="0"/>
+              <a:buChar char="•"/>
+              <a:defRPr sz="1800" kern="1200">
+                <a:solidFill>
+                  <a:schemeClr val="tx1"/>
+                </a:solidFill>
+                <a:latin typeface="+mn-lt"/>
+                <a:ea typeface="+mn-ea"/>
+                <a:cs typeface="+mn-cs"/>
+              </a:defRPr>
+            </a:lvl4pPr>
+            <a:lvl5pPr marL="2057400" indent="-228600" algn="l" defTabSz="914400" rtl="0" eaLnBrk="1" latinLnBrk="0" hangingPunct="1">
+              <a:lnSpc>
+                <a:spcPct val="90000"/>
+              </a:lnSpc>
+              <a:spcBef>
+                <a:spcPts val="500"/>
+              </a:spcBef>
+              <a:buFont typeface="Arial" panose="020B0604020202020204" pitchFamily="34" charset="0"/>
+              <a:buChar char="•"/>
+              <a:defRPr sz="1800" kern="1200">
+                <a:solidFill>
+                  <a:schemeClr val="tx1"/>
+                </a:solidFill>
+                <a:latin typeface="+mn-lt"/>
+                <a:ea typeface="+mn-ea"/>
+                <a:cs typeface="+mn-cs"/>
+              </a:defRPr>
+            </a:lvl5pPr>
+            <a:lvl6pPr marL="2514600" indent="-228600" algn="l" defTabSz="914400" rtl="0" eaLnBrk="1" latinLnBrk="0" hangingPunct="1">
+              <a:lnSpc>
+                <a:spcPct val="90000"/>
+              </a:lnSpc>
+              <a:spcBef>
+                <a:spcPts val="500"/>
+              </a:spcBef>
+              <a:buFont typeface="Arial" panose="020B0604020202020204" pitchFamily="34" charset="0"/>
+              <a:buChar char="•"/>
+              <a:defRPr sz="1800" kern="1200">
+                <a:solidFill>
+                  <a:schemeClr val="tx1"/>
+                </a:solidFill>
+                <a:latin typeface="+mn-lt"/>
+                <a:ea typeface="+mn-ea"/>
+                <a:cs typeface="+mn-cs"/>
+              </a:defRPr>
+            </a:lvl6pPr>
+            <a:lvl7pPr marL="2971800" indent="-228600" algn="l" defTabSz="914400" rtl="0" eaLnBrk="1" latinLnBrk="0" hangingPunct="1">
+              <a:lnSpc>
+                <a:spcPct val="90000"/>
+              </a:lnSpc>
+              <a:spcBef>
+                <a:spcPts val="500"/>
+              </a:spcBef>
+              <a:buFont typeface="Arial" panose="020B0604020202020204" pitchFamily="34" charset="0"/>
+              <a:buChar char="•"/>
+              <a:defRPr sz="1800" kern="1200">
+                <a:solidFill>
+                  <a:schemeClr val="tx1"/>
+                </a:solidFill>
+                <a:latin typeface="+mn-lt"/>
+                <a:ea typeface="+mn-ea"/>
+                <a:cs typeface="+mn-cs"/>
+              </a:defRPr>
+            </a:lvl7pPr>
+            <a:lvl8pPr marL="3429000" indent="-228600" algn="l" defTabSz="914400" rtl="0" eaLnBrk="1" latinLnBrk="0" hangingPunct="1">
+              <a:lnSpc>
+                <a:spcPct val="90000"/>
+              </a:lnSpc>
+              <a:spcBef>
+                <a:spcPts val="500"/>
+              </a:spcBef>
+              <a:buFont typeface="Arial" panose="020B0604020202020204" pitchFamily="34" charset="0"/>
+              <a:buChar char="•"/>
+              <a:defRPr sz="1800" kern="1200">
+                <a:solidFill>
+                  <a:schemeClr val="tx1"/>
+                </a:solidFill>
+                <a:latin typeface="+mn-lt"/>
+                <a:ea typeface="+mn-ea"/>
+                <a:cs typeface="+mn-cs"/>
+              </a:defRPr>
+            </a:lvl8pPr>
+            <a:lvl9pPr marL="3886200" indent="-228600" algn="l" defTabSz="914400" rtl="0" eaLnBrk="1" latinLnBrk="0" hangingPunct="1">
+              <a:lnSpc>
+                <a:spcPct val="90000"/>
+              </a:lnSpc>
+              <a:spcBef>
+                <a:spcPts val="500"/>
+              </a:spcBef>
+              <a:buFont typeface="Arial" panose="020B0604020202020204" pitchFamily="34" charset="0"/>
+              <a:buChar char="•"/>
+              <a:defRPr sz="1800" kern="1200">
+                <a:solidFill>
+                  <a:schemeClr val="tx1"/>
+                </a:solidFill>
+                <a:latin typeface="+mn-lt"/>
+                <a:ea typeface="+mn-ea"/>
+                <a:cs typeface="+mn-cs"/>
+              </a:defRPr>
+            </a:lvl9pPr>
+          </a:lstStyle>
+          <a:p>
+            <a:r>
+              <a:rPr lang="en-CH" dirty="0"/>
+              <a:t>The Unittest runner is used but we plan to switch to Pytest. </a:t>
+            </a:r>
+          </a:p>
+          <a:p>
+            <a:r>
+              <a:rPr lang="en-CH" dirty="0"/>
+              <a:t>One class of tests per module. </a:t>
+            </a:r>
+          </a:p>
+          <a:p>
+            <a:r>
+              <a:rPr lang="en-CH" dirty="0"/>
+              <a:t>Each class contains many tests aiming to cover 100% of the code. </a:t>
+            </a:r>
+          </a:p>
+        </p:txBody>
+      </p:sp>
+    </p:spTree>
+    <p:extLst>
+      <p:ext uri="{BB962C8B-B14F-4D97-AF65-F5344CB8AC3E}">
+        <p14:creationId xmlns:p14="http://schemas.microsoft.com/office/powerpoint/2010/main" val="3994066588"/>
+      </p:ext>
+    </p:extLst>
+  </p:cSld>
+  <p:clrMapOvr>
+    <a:masterClrMapping/>
+  </p:clrMapOvr>
+</p:sld>
+</file>
+
 <file path=ppt/slides/slide7.xml><?xml version="1.0" encoding="utf-8"?>
 <p:sld xmlns:a="http://schemas.openxmlformats.org/drawingml/2006/main" xmlns:r="http://schemas.openxmlformats.org/officeDocument/2006/relationships" xmlns:p="http://schemas.openxmlformats.org/presentationml/2006/main">
   <p:cSld>
@@ -5283,17 +5027,17 @@
           <a:p>
             <a:r>
               <a:rPr lang="en-CH" b="1" u="sng" dirty="0"/>
-              <a:t>Unit testing</a:t>
-            </a:r>
-          </a:p>
-        </p:txBody>
-      </p:sp>
-      <p:sp>
-        <p:nvSpPr>
-          <p:cNvPr id="3" name="Content Placeholder 2">
-            <a:extLst>
-              <a:ext uri="{FF2B5EF4-FFF2-40B4-BE49-F238E27FC236}">
-                <a16:creationId xmlns:a16="http://schemas.microsoft.com/office/drawing/2014/main" id="{FB073B1C-8580-5B4E-ACD7-81B193BD4CB1}"/>
+              <a:t>Plan</a:t>
+            </a:r>
+          </a:p>
+        </p:txBody>
+      </p:sp>
+      <p:sp>
+        <p:nvSpPr>
+          <p:cNvPr id="4" name="Content Placeholder 3">
+            <a:extLst>
+              <a:ext uri="{FF2B5EF4-FFF2-40B4-BE49-F238E27FC236}">
+                <a16:creationId xmlns:a16="http://schemas.microsoft.com/office/drawing/2014/main" id="{DE452802-ABF5-6F4C-A280-A0A4B25E4C05}"/>
               </a:ext>
             </a:extLst>
           </p:cNvPr>
@@ -5309,14 +5053,85 @@
           <a:bodyPr/>
           <a:lstStyle/>
           <a:p>
-            <a:endParaRPr lang="en-CH" dirty="0"/>
+            <a:r>
+              <a:rPr lang="en-GB" dirty="0"/>
+              <a:t>Current situation: </a:t>
+            </a:r>
+          </a:p>
+          <a:p>
+            <a:pPr lvl="1"/>
+            <a:r>
+              <a:rPr lang="en-GB" dirty="0"/>
+              <a:t>The functional part of the project (</a:t>
+            </a:r>
+            <a:r>
+              <a:rPr lang="en-GB" dirty="0" err="1"/>
+              <a:t>preprocessing</a:t>
+            </a:r>
+            <a:r>
+              <a:rPr lang="en-GB"/>
+              <a:t> and training</a:t>
+            </a:r>
+            <a:r>
+              <a:rPr lang="en-GB" dirty="0"/>
+              <a:t>) is finished. </a:t>
+            </a:r>
+          </a:p>
+          <a:p>
+            <a:pPr lvl="1"/>
+            <a:r>
+              <a:rPr lang="en-GB" dirty="0"/>
+              <a:t>The testing part is almost done.</a:t>
+            </a:r>
+          </a:p>
+          <a:p>
+            <a:r>
+              <a:rPr lang="en-GB" dirty="0"/>
+              <a:t>Next steps: </a:t>
+            </a:r>
+          </a:p>
+          <a:p>
+            <a:pPr lvl="1"/>
+            <a:r>
+              <a:rPr lang="en-GB" dirty="0"/>
+              <a:t>Results analysing. </a:t>
+            </a:r>
+          </a:p>
+          <a:p>
+            <a:pPr lvl="1"/>
+            <a:r>
+              <a:rPr lang="en-GB" dirty="0"/>
+              <a:t>Tests improvement with </a:t>
+            </a:r>
+            <a:r>
+              <a:rPr lang="en-GB" dirty="0" err="1"/>
+              <a:t>Pytest</a:t>
+            </a:r>
+            <a:r>
+              <a:rPr lang="en-GB" dirty="0"/>
+              <a:t>. </a:t>
+            </a:r>
+          </a:p>
+          <a:p>
+            <a:pPr lvl="1"/>
+            <a:r>
+              <a:rPr lang="en-GB" dirty="0"/>
+              <a:t>CI/CD integration. </a:t>
+            </a:r>
+          </a:p>
+          <a:p>
+            <a:pPr lvl="1"/>
+            <a:r>
+              <a:rPr lang="en-GB" dirty="0"/>
+              <a:t>Documentations. </a:t>
+            </a:r>
           </a:p>
         </p:txBody>
       </p:sp>
     </p:spTree>
     <p:extLst>
       <p:ext uri="{BB962C8B-B14F-4D97-AF65-F5344CB8AC3E}">
-        <p14:creationId xmlns:p14="http://schemas.microsoft.com/office/powerpoint/2010/main" val="3994066588"/>
+        <p14:creationId xmlns:p14="http://schemas.microsoft.com/office/powerpoint/2010/main" val="2849052916"/>
       </p:ext>
     </p:extLst>
   </p:cSld>

</xml_diff>